<commit_message>
Updates on assignment module 12
</commit_message>
<xml_diff>
--- a/Module_11_StemCells/Conclusion_project/Presentation.pptx
+++ b/Module_11_StemCells/Conclusion_project/Presentation.pptx
@@ -5,7 +5,7 @@
     <p:sldMasterId id="2147483660" r:id="rId1"/>
   </p:sldMasterIdLst>
   <p:notesMasterIdLst>
-    <p:notesMasterId r:id="rId9"/>
+    <p:notesMasterId r:id="rId10"/>
   </p:notesMasterIdLst>
   <p:sldIdLst>
     <p:sldId id="256" r:id="rId2"/>
@@ -15,6 +15,7 @@
     <p:sldId id="262" r:id="rId6"/>
     <p:sldId id="261" r:id="rId7"/>
     <p:sldId id="260" r:id="rId8"/>
+    <p:sldId id="263" r:id="rId9"/>
   </p:sldIdLst>
   <p:sldSz cx="12192000" cy="6858000"/>
   <p:notesSz cx="6858000" cy="9144000"/>
@@ -5953,7 +5954,7 @@
         </p:nvCxnSpPr>
         <p:spPr>
           <a:xfrm>
-            <a:off x="615462" y="1134208"/>
+            <a:off x="660618" y="994469"/>
             <a:ext cx="9026079" cy="0"/>
           </a:xfrm>
           <a:prstGeom prst="line">
@@ -6715,6 +6716,136 @@
     <p:extLst>
       <p:ext uri="{BB962C8B-B14F-4D97-AF65-F5344CB8AC3E}">
         <p14:creationId xmlns:p14="http://schemas.microsoft.com/office/powerpoint/2010/main" val="3516584745"/>
+      </p:ext>
+    </p:extLst>
+  </p:cSld>
+  <p:clrMapOvr>
+    <a:masterClrMapping/>
+  </p:clrMapOvr>
+</p:sld>
+</file>
+
+<file path=ppt/slides/slide8.xml><?xml version="1.0" encoding="utf-8"?>
+<p:sld xmlns:a="http://schemas.openxmlformats.org/drawingml/2006/main" xmlns:r="http://schemas.openxmlformats.org/officeDocument/2006/relationships" xmlns:p="http://schemas.openxmlformats.org/presentationml/2006/main">
+  <p:cSld>
+    <p:spTree>
+      <p:nvGrpSpPr>
+        <p:cNvPr id="1" name=""/>
+        <p:cNvGrpSpPr/>
+        <p:nvPr/>
+      </p:nvGrpSpPr>
+      <p:grpSpPr>
+        <a:xfrm>
+          <a:off x="0" y="0"/>
+          <a:ext cx="0" cy="0"/>
+          <a:chOff x="0" y="0"/>
+          <a:chExt cx="0" cy="0"/>
+        </a:xfrm>
+      </p:grpSpPr>
+      <p:cxnSp>
+        <p:nvCxnSpPr>
+          <p:cNvPr id="4" name="Straight Connector 3">
+            <a:extLst>
+              <a:ext uri="{FF2B5EF4-FFF2-40B4-BE49-F238E27FC236}">
+                <a16:creationId xmlns:a16="http://schemas.microsoft.com/office/drawing/2014/main" id="{D533236A-8147-057D-A124-6C550333FD08}"/>
+              </a:ext>
+            </a:extLst>
+          </p:cNvPr>
+          <p:cNvCxnSpPr>
+            <a:cxnSpLocks/>
+          </p:cNvCxnSpPr>
+          <p:nvPr/>
+        </p:nvCxnSpPr>
+        <p:spPr>
+          <a:xfrm>
+            <a:off x="660618" y="994469"/>
+            <a:ext cx="9026079" cy="0"/>
+          </a:xfrm>
+          <a:prstGeom prst="line">
+            <a:avLst/>
+          </a:prstGeom>
+          <a:ln w="25400"/>
+        </p:spPr>
+        <p:style>
+          <a:lnRef idx="1">
+            <a:schemeClr val="accent1"/>
+          </a:lnRef>
+          <a:fillRef idx="0">
+            <a:schemeClr val="accent1"/>
+          </a:fillRef>
+          <a:effectRef idx="0">
+            <a:schemeClr val="accent1"/>
+          </a:effectRef>
+          <a:fontRef idx="minor">
+            <a:schemeClr val="tx1"/>
+          </a:fontRef>
+        </p:style>
+      </p:cxnSp>
+      <p:sp>
+        <p:nvSpPr>
+          <p:cNvPr id="5" name="TextBox 4">
+            <a:extLst>
+              <a:ext uri="{FF2B5EF4-FFF2-40B4-BE49-F238E27FC236}">
+                <a16:creationId xmlns:a16="http://schemas.microsoft.com/office/drawing/2014/main" id="{C066B72E-A8CD-8B94-1AE7-AAB8AF8E5629}"/>
+              </a:ext>
+            </a:extLst>
+          </p:cNvPr>
+          <p:cNvSpPr txBox="1"/>
+          <p:nvPr/>
+        </p:nvSpPr>
+        <p:spPr>
+          <a:xfrm>
+            <a:off x="402407" y="409694"/>
+            <a:ext cx="10408089" cy="1323439"/>
+          </a:xfrm>
+          <a:prstGeom prst="rect">
+            <a:avLst/>
+          </a:prstGeom>
+          <a:noFill/>
+        </p:spPr>
+        <p:txBody>
+          <a:bodyPr wrap="square">
+            <a:spAutoFit/>
+          </a:bodyPr>
+          <a:lstStyle/>
+          <a:p>
+            <a:r>
+              <a:rPr lang="en-US" sz="4000" dirty="0">
+                <a:solidFill>
+                  <a:schemeClr val="accent1"/>
+                </a:solidFill>
+                <a:latin typeface="Tahoma" panose="020B0604030504040204" pitchFamily="34" charset="0"/>
+                <a:ea typeface="Tahoma" panose="020B0604030504040204" pitchFamily="34" charset="0"/>
+                <a:cs typeface="Tahoma" panose="020B0604030504040204" pitchFamily="34" charset="0"/>
+              </a:rPr>
+              <a:t>Neural-Spinal Scaffold Combined With NS a promising treatment </a:t>
+            </a:r>
+            <a:r>
+              <a:rPr lang="en-US" sz="4000">
+                <a:solidFill>
+                  <a:schemeClr val="accent1"/>
+                </a:solidFill>
+                <a:latin typeface="Tahoma" panose="020B0604030504040204" pitchFamily="34" charset="0"/>
+                <a:ea typeface="Tahoma" panose="020B0604030504040204" pitchFamily="34" charset="0"/>
+                <a:cs typeface="Tahoma" panose="020B0604030504040204" pitchFamily="34" charset="0"/>
+              </a:rPr>
+              <a:t>for acute SCI</a:t>
+            </a:r>
+            <a:endParaRPr lang="en-US" sz="4000" dirty="0">
+              <a:solidFill>
+                <a:schemeClr val="accent1"/>
+              </a:solidFill>
+              <a:latin typeface="Tahoma" panose="020B0604030504040204" pitchFamily="34" charset="0"/>
+              <a:ea typeface="Tahoma" panose="020B0604030504040204" pitchFamily="34" charset="0"/>
+              <a:cs typeface="Tahoma" panose="020B0604030504040204" pitchFamily="34" charset="0"/>
+            </a:endParaRPr>
+          </a:p>
+        </p:txBody>
+      </p:sp>
+    </p:spTree>
+    <p:extLst>
+      <p:ext uri="{BB962C8B-B14F-4D97-AF65-F5344CB8AC3E}">
+        <p14:creationId xmlns:p14="http://schemas.microsoft.com/office/powerpoint/2010/main" val="1879596822"/>
       </p:ext>
     </p:extLst>
   </p:cSld>

</xml_diff>